<commit_message>
update presentation class diagram
</commit_message>
<xml_diff>
--- a/Presentatie/iteratie2.pptx
+++ b/Presentatie/iteratie2.pptx
@@ -6666,7 +6666,6 @@
               <a:rPr lang="en-US" dirty="0" smtClean="0"/>
               <a:t>Mocking</a:t>
             </a:r>
-            <a:endParaRPr lang="en-US" dirty="0" smtClean="0"/>
           </a:p>
         </p:txBody>
       </p:sp>
@@ -7490,7 +7489,7 @@
       </p:sp>
       <p:pic>
         <p:nvPicPr>
-          <p:cNvPr id="1031" name="Picture 7" descr="C:\Users\simon\Desktop\Class Diagram2 packaged.jpg"/>
+          <p:cNvPr id="1026" name="Picture 2" descr="C:\Users\simon\Desktop\Programmeren\OSS\oss stuff\class diagram.jpg"/>
           <p:cNvPicPr>
             <a:picLocks noChangeAspect="1" noChangeArrowheads="1"/>
           </p:cNvPicPr>
@@ -7511,8 +7510,8 @@
         </p:blipFill>
         <p:spPr bwMode="auto">
           <a:xfrm>
-            <a:off x="395536" y="1364665"/>
-            <a:ext cx="8223151" cy="4430843"/>
+            <a:off x="323528" y="1200572"/>
+            <a:ext cx="8460432" cy="4558695"/>
           </a:xfrm>
           <a:prstGeom prst="rect">
             <a:avLst/>

</xml_diff>